<commit_message>
update in Lecture 1
</commit_message>
<xml_diff>
--- a/Lecture_1/ABilandzic_PH8124_SS2021.pptx
+++ b/Lecture_1/ABilandzic_PH8124_SS2021.pptx
@@ -333,7 +333,7 @@
           <a:p>
             <a:fld id="{F929CBCE-E64B-4074-AF48-7FACC033E4C9}" type="datetimeFigureOut">
               <a:rPr lang="en-US" smtClean="0"/>
-              <a:t>3/11/2021</a:t>
+              <a:t>4/5/2021</a:t>
             </a:fld>
             <a:endParaRPr lang="en-US"/>
           </a:p>
@@ -5480,17 +5480,8 @@
             </a:br>
             <a:r>
               <a:rPr lang="en-US" sz="2400" dirty="0" smtClean="0"/>
-              <a:t>Lecture 1, </a:t>
-            </a:r>
-            <a:r>
-              <a:rPr lang="en-US" sz="2400" dirty="0" smtClean="0"/>
-              <a:t>15</a:t>
-            </a:r>
-            <a:r>
-              <a:rPr lang="en-US" sz="2400" dirty="0" smtClean="0"/>
-              <a:t>.04.2021</a:t>
-            </a:r>
-            <a:endParaRPr lang="en-US" sz="2400" dirty="0" smtClean="0"/>
+              <a:t>Lecture 1, 15.04.2021</a:t>
+            </a:r>
           </a:p>
         </p:txBody>
       </p:sp>
@@ -5929,58 +5920,18 @@
                   <a:srgbClr val="FF0000"/>
                 </a:solidFill>
               </a:rPr>
-              <a:t>May </a:t>
-            </a:r>
+              <a:t>May 13th – Ascension Day</a:t>
+            </a:r>
+          </a:p>
+          <a:p>
+            <a:pPr lvl="1"/>
             <a:r>
               <a:rPr lang="da-DK" dirty="0" smtClean="0">
                 <a:solidFill>
                   <a:srgbClr val="FF0000"/>
                 </a:solidFill>
               </a:rPr>
-              <a:t>13th </a:t>
-            </a:r>
-            <a:r>
-              <a:rPr lang="da-DK" dirty="0" smtClean="0">
-                <a:solidFill>
-                  <a:srgbClr val="FF0000"/>
-                </a:solidFill>
-              </a:rPr>
-              <a:t>– Ascension Day</a:t>
-            </a:r>
-          </a:p>
-          <a:p>
-            <a:pPr lvl="1"/>
-            <a:r>
-              <a:rPr lang="da-DK" dirty="0" smtClean="0">
-                <a:solidFill>
-                  <a:srgbClr val="FF0000"/>
-                </a:solidFill>
-              </a:rPr>
-              <a:t>June </a:t>
-            </a:r>
-            <a:r>
-              <a:rPr lang="da-DK" dirty="0" smtClean="0">
-                <a:solidFill>
-                  <a:srgbClr val="FF0000"/>
-                </a:solidFill>
-              </a:rPr>
-              <a:t>03rd</a:t>
-            </a:r>
-            <a:r>
-              <a:rPr lang="da-DK" dirty="0" smtClean="0">
-                <a:solidFill>
-                  <a:srgbClr val="FF0000"/>
-                </a:solidFill>
-              </a:rPr>
-              <a:t> </a:t>
-            </a:r>
-            <a:r>
-              <a:rPr lang="da-DK" dirty="0" smtClean="0">
-                <a:solidFill>
-                  <a:srgbClr val="FF0000"/>
-                </a:solidFill>
-              </a:rPr>
-              <a:t>– Corpus Christi</a:t>
+              <a:t>June 03rd – Corpus Christi</a:t>
             </a:r>
           </a:p>
         </p:txBody>
@@ -6501,12 +6452,12 @@
         <p:spPr>
           <a:xfrm>
             <a:off x="304800" y="1371600"/>
-            <a:ext cx="8686800" cy="2133600"/>
+            <a:ext cx="8686800" cy="3048000"/>
           </a:xfrm>
         </p:spPr>
         <p:txBody>
           <a:bodyPr>
-            <a:normAutofit/>
+            <a:normAutofit lnSpcReduction="10000"/>
           </a:bodyPr>
           <a:lstStyle/>
           <a:p>
@@ -6532,12 +6483,24 @@
           </a:p>
           <a:p>
             <a:r>
-              <a:rPr lang="en-GB" dirty="0"/>
-              <a:t>Developed </a:t>
+              <a:rPr lang="en-GB" b="1" dirty="0" smtClean="0">
+                <a:solidFill>
+                  <a:srgbClr val="C00000"/>
+                </a:solidFill>
+              </a:rPr>
+              <a:t>Linux kernel:</a:t>
+            </a:r>
+            <a:r>
+              <a:rPr lang="en-GB" b="1" dirty="0" smtClean="0"/>
+              <a:t> </a:t>
             </a:r>
             <a:r>
               <a:rPr lang="en-GB" dirty="0" smtClean="0"/>
-              <a:t>initially by </a:t>
+              <a:t>d</a:t>
+            </a:r>
+            <a:r>
+              <a:rPr lang="en-GB" dirty="0" smtClean="0"/>
+              <a:t>eveloped by </a:t>
             </a:r>
             <a:r>
               <a:rPr lang="en-GB" dirty="0"/>
@@ -6545,17 +6508,56 @@
             </a:r>
             <a:r>
               <a:rPr lang="en-GB" dirty="0" smtClean="0"/>
-              <a:t>Torvalds in the early 90s, and then by </a:t>
+              <a:t>Torvalds in the early </a:t>
+            </a:r>
+            <a:r>
+              <a:rPr lang="en-GB" dirty="0" smtClean="0"/>
+              <a:t>90s</a:t>
+            </a:r>
+          </a:p>
+          <a:p>
+            <a:r>
+              <a:rPr lang="en-GB" b="1" dirty="0" smtClean="0">
+                <a:solidFill>
+                  <a:srgbClr val="C00000"/>
+                </a:solidFill>
+              </a:rPr>
+              <a:t>GNU (‘GNU’s not Unix’): </a:t>
+            </a:r>
+            <a:r>
+              <a:rPr lang="en-GB" dirty="0" smtClean="0"/>
+              <a:t>open source utilities </a:t>
             </a:r>
             <a:r>
               <a:rPr lang="en-GB" dirty="0"/>
-              <a:t>thousands of </a:t>
+              <a:t>to perform standard actions </a:t>
             </a:r>
             <a:r>
               <a:rPr lang="en-GB" dirty="0" smtClean="0"/>
-              <a:t>collaborators afterwards</a:t>
-            </a:r>
-            <a:endParaRPr lang="en-GB" dirty="0"/>
+              <a:t>on the computer - </a:t>
+            </a:r>
+            <a:r>
+              <a:rPr lang="en-GB" dirty="0"/>
+              <a:t>no </a:t>
+            </a:r>
+            <a:r>
+              <a:rPr lang="en-GB" dirty="0" smtClean="0"/>
+              <a:t>licencing</a:t>
+            </a:r>
+          </a:p>
+          <a:p>
+            <a:pPr lvl="1"/>
+            <a:r>
+              <a:rPr lang="en-GB" dirty="0" smtClean="0"/>
+              <a:t>Linux kernel + GNU utilities = Linux operating system</a:t>
+            </a:r>
+          </a:p>
+          <a:p>
+            <a:r>
+              <a:rPr lang="en-GB" dirty="0" smtClean="0"/>
+              <a:t>Initially, the Linux OS was basically a free Unix </a:t>
+            </a:r>
+            <a:endParaRPr lang="en-GB" dirty="0" smtClean="0"/>
           </a:p>
         </p:txBody>
       </p:sp>
@@ -6604,8 +6606,8 @@
         </p:blipFill>
         <p:spPr>
           <a:xfrm>
-            <a:off x="961860" y="3352800"/>
-            <a:ext cx="2771940" cy="3392456"/>
+            <a:off x="1066800" y="4325235"/>
+            <a:ext cx="2024794" cy="2478056"/>
           </a:xfrm>
           <a:prstGeom prst="rect">
             <a:avLst/>
@@ -6620,7 +6622,7 @@
         </p:nvSpPr>
         <p:spPr>
           <a:xfrm>
-            <a:off x="3963182" y="4382869"/>
+            <a:off x="3733800" y="5029200"/>
             <a:ext cx="4572000" cy="646331"/>
           </a:xfrm>
           <a:prstGeom prst="rect">
@@ -6757,33 +6759,138 @@
         <p:spPr>
           <a:xfrm>
             <a:off x="304800" y="1371600"/>
-            <a:ext cx="8686800" cy="2286000"/>
+            <a:ext cx="8686800" cy="3124200"/>
           </a:xfrm>
         </p:spPr>
         <p:txBody>
           <a:bodyPr>
-            <a:normAutofit lnSpcReduction="10000"/>
+            <a:normAutofit fontScale="92500"/>
           </a:bodyPr>
           <a:lstStyle/>
           <a:p>
             <a:r>
               <a:rPr lang="en-GB" dirty="0" smtClean="0"/>
-              <a:t>Plethora of different Linux distributions (Ubuntu, Fedora, CentOS, Scientific Linux, </a:t>
-            </a:r>
-            <a:r>
-              <a:rPr lang="en-DE" dirty="0" smtClean="0"/>
-              <a:t>…</a:t>
+              <a:t>Plethora of different Linux </a:t>
             </a:r>
             <a:r>
               <a:rPr lang="en-GB" dirty="0" smtClean="0"/>
-              <a:t>)</a:t>
-            </a:r>
-          </a:p>
-          <a:p>
+              <a:t>distributions:</a:t>
+            </a:r>
+          </a:p>
+          <a:p>
+            <a:pPr lvl="1"/>
             <a:r>
               <a:rPr lang="en-GB" dirty="0" smtClean="0"/>
-              <a:t>The material presented in this course will be demonstrated on Ubuntu, but no worries... everything applies also to any other Linux distribution (as we are covering only the core Linux  functionalities!)</a:t>
-            </a:r>
+              <a:t>Full-core: </a:t>
+            </a:r>
+            <a:r>
+              <a:rPr lang="en-GB" dirty="0" err="1"/>
+              <a:t>Debian</a:t>
+            </a:r>
+            <a:r>
+              <a:rPr lang="en-GB" dirty="0"/>
+              <a:t>, </a:t>
+            </a:r>
+            <a:r>
+              <a:rPr lang="en-GB" dirty="0" smtClean="0"/>
+              <a:t>Red Hat Enterprise, </a:t>
+            </a:r>
+            <a:r>
+              <a:rPr lang="en-GB" dirty="0" err="1" smtClean="0"/>
+              <a:t>openSUSE</a:t>
+            </a:r>
+            <a:r>
+              <a:rPr lang="en-GB" dirty="0" smtClean="0"/>
+              <a:t>, etc.</a:t>
+            </a:r>
+          </a:p>
+          <a:p>
+            <a:pPr lvl="1"/>
+            <a:r>
+              <a:rPr lang="en-GB" dirty="0" smtClean="0"/>
+              <a:t>Specific: </a:t>
+            </a:r>
+            <a:r>
+              <a:rPr lang="en-GB" dirty="0" smtClean="0"/>
+              <a:t>Ubuntu</a:t>
+            </a:r>
+            <a:r>
+              <a:rPr lang="en-GB" dirty="0" smtClean="0"/>
+              <a:t>, Fedora, CentOS, Scientific Linux</a:t>
+            </a:r>
+            <a:r>
+              <a:rPr lang="en-GB" dirty="0" smtClean="0"/>
+              <a:t>, Linux Mint, etc.</a:t>
+            </a:r>
+            <a:endParaRPr lang="en-GB" dirty="0" smtClean="0"/>
+          </a:p>
+          <a:p>
+            <a:r>
+              <a:rPr lang="en-GB" dirty="0" smtClean="0"/>
+              <a:t>Specific distributions are derivatives of full-core distributions: </a:t>
+            </a:r>
+          </a:p>
+          <a:p>
+            <a:pPr lvl="1"/>
+            <a:r>
+              <a:rPr lang="en-GB" dirty="0" smtClean="0"/>
+              <a:t>Ubuntu is derivative of </a:t>
+            </a:r>
+            <a:r>
+              <a:rPr lang="en-GB" dirty="0" err="1" smtClean="0"/>
+              <a:t>Debian</a:t>
+            </a:r>
+            <a:r>
+              <a:rPr lang="en-GB" dirty="0" smtClean="0"/>
+              <a:t>, Fedora of Red Hat, etc.</a:t>
+            </a:r>
+          </a:p>
+          <a:p>
+            <a:r>
+              <a:rPr lang="en-GB" dirty="0" smtClean="0"/>
+              <a:t>The </a:t>
+            </a:r>
+            <a:r>
+              <a:rPr lang="en-GB" dirty="0" smtClean="0"/>
+              <a:t>material presented in this course will be demonstrated on Ubuntu, but </a:t>
+            </a:r>
+            <a:r>
+              <a:rPr lang="en-GB" dirty="0" smtClean="0"/>
+              <a:t>it </a:t>
+            </a:r>
+            <a:r>
+              <a:rPr lang="en-GB" dirty="0" smtClean="0"/>
+              <a:t>applies also to any other Linux </a:t>
+            </a:r>
+            <a:r>
+              <a:rPr lang="en-GB" dirty="0" smtClean="0"/>
+              <a:t>distribution</a:t>
+            </a:r>
+          </a:p>
+          <a:p>
+            <a:r>
+              <a:rPr lang="en-GB" dirty="0" smtClean="0"/>
+              <a:t>Regular updates on all distributions</a:t>
+            </a:r>
+            <a:r>
+              <a:rPr lang="en-GB" dirty="0"/>
+              <a:t>: </a:t>
+            </a:r>
+            <a:r>
+              <a:rPr lang="en-GB" dirty="0">
+                <a:hlinkClick r:id="rId2"/>
+              </a:rPr>
+              <a:t>https://</a:t>
+            </a:r>
+            <a:r>
+              <a:rPr lang="en-GB" dirty="0" smtClean="0">
+                <a:hlinkClick r:id="rId2"/>
+              </a:rPr>
+              <a:t>distrowatch.com</a:t>
+            </a:r>
+            <a:endParaRPr lang="en-GB" dirty="0" smtClean="0"/>
+          </a:p>
+          <a:p>
             <a:endParaRPr lang="en-GB" dirty="0"/>
           </a:p>
         </p:txBody>
@@ -6826,7 +6933,7 @@
           <p:nvPr/>
         </p:nvPicPr>
         <p:blipFill>
-          <a:blip r:embed="rId2">
+          <a:blip r:embed="rId3">
             <a:extLst>
               <a:ext uri="{28A0092B-C50C-407E-A947-70E740481C1C}">
                 <a14:useLocalDpi xmlns:a14="http://schemas.microsoft.com/office/drawing/2010/main" val="0"/>
@@ -6840,8 +6947,8 @@
         </p:blipFill>
         <p:spPr bwMode="auto">
           <a:xfrm>
-            <a:off x="2019300" y="3886200"/>
-            <a:ext cx="5143500" cy="2314575"/>
+            <a:off x="2133600" y="4495800"/>
+            <a:ext cx="4639733" cy="2087880"/>
           </a:xfrm>
           <a:prstGeom prst="rect">
             <a:avLst/>
@@ -7260,7 +7367,19 @@
               <a:rPr lang="en-GB" dirty="0">
                 <a:effectLst/>
               </a:rPr>
-              <a:t>( https://www.putty.org/ ) and then use it to connect to some machine running Linux</a:t>
+              <a:t>( https://www.putty.org/ ) and then use it to connect to some </a:t>
+            </a:r>
+            <a:r>
+              <a:rPr lang="en-GB" dirty="0" smtClean="0">
+                <a:effectLst/>
+              </a:rPr>
+              <a:t>computer </a:t>
+            </a:r>
+            <a:r>
+              <a:rPr lang="en-GB" dirty="0">
+                <a:effectLst/>
+              </a:rPr>
+              <a:t>running Linux</a:t>
             </a:r>
             <a:r>
               <a:rPr lang="en-GB" dirty="0" smtClean="0">
@@ -7780,7 +7899,15 @@
           <a:p>
             <a:r>
               <a:rPr lang="en-GB" dirty="0" smtClean="0"/>
-              <a:t>What we can do in the terminal?</a:t>
+              <a:t>What </a:t>
+            </a:r>
+            <a:r>
+              <a:rPr lang="en-GB" dirty="0" smtClean="0"/>
+              <a:t>can we </a:t>
+            </a:r>
+            <a:r>
+              <a:rPr lang="en-GB" dirty="0" smtClean="0"/>
+              <a:t>do in the terminal?</a:t>
             </a:r>
             <a:endParaRPr lang="en-US" dirty="0" smtClean="0"/>
           </a:p>
@@ -7964,8 +8091,13 @@
             </a:r>
             <a:r>
               <a:rPr lang="en-US" dirty="0" smtClean="0"/>
-              <a:t>commands in the terminal (text window)</a:t>
-            </a:r>
+              <a:t>commands in the terminal (text window</a:t>
+            </a:r>
+            <a:r>
+              <a:rPr lang="en-US" dirty="0" smtClean="0"/>
+              <a:t>)</a:t>
+            </a:r>
+            <a:endParaRPr lang="en-US" dirty="0" smtClean="0"/>
           </a:p>
           <a:p>
             <a:r>
@@ -8001,7 +8133,6 @@
               <a:rPr lang="da-DK" dirty="0" smtClean="0"/>
               <a:t>zsh</a:t>
             </a:r>
-            <a:endParaRPr lang="da-DK" dirty="0" smtClean="0"/>
           </a:p>
           <a:p>
             <a:pPr lvl="1"/>
@@ -8617,17 +8748,57 @@
           <a:p>
             <a:r>
               <a:rPr lang="da-DK" dirty="0" smtClean="0"/>
-              <a:t>Written by Brian Fox in 1989... And it’s still alive!!</a:t>
-            </a:r>
-          </a:p>
-          <a:p>
+              <a:t>Initial development </a:t>
+            </a:r>
             <a:r>
               <a:rPr lang="da-DK" dirty="0" smtClean="0"/>
-              <a:t>Bash is an acronym for ‘Bourne-again shell</a:t>
-            </a:r>
+              <a:t>by Brian Fox in </a:t>
+            </a:r>
+            <a:r>
+              <a:rPr lang="da-DK" dirty="0" smtClean="0"/>
+              <a:t>1989 as a part of GNU project... And </a:t>
+            </a:r>
+            <a:r>
+              <a:rPr lang="da-DK" dirty="0" smtClean="0"/>
+              <a:t>it’s still alive</a:t>
+            </a:r>
+            <a:r>
+              <a:rPr lang="da-DK" dirty="0" smtClean="0"/>
+              <a:t>!</a:t>
+            </a:r>
+            <a:endParaRPr lang="da-DK" dirty="0" smtClean="0"/>
+          </a:p>
+          <a:p>
+            <a:r>
+              <a:rPr lang="da-DK" dirty="0" smtClean="0"/>
+              <a:t>Bash is an acronym for ‘Bourne-again </a:t>
+            </a:r>
+            <a:r>
+              <a:rPr lang="da-DK" dirty="0" smtClean="0"/>
+              <a:t>shell’</a:t>
+            </a:r>
+          </a:p>
+          <a:p>
+            <a:pPr lvl="1"/>
             <a:r>
               <a:rPr lang="da-DK" dirty="0"/>
-              <a:t>’ (the original shell was </a:t>
+              <a:t>T</a:t>
+            </a:r>
+            <a:r>
+              <a:rPr lang="da-DK" dirty="0" smtClean="0"/>
+              <a:t>he </a:t>
+            </a:r>
+            <a:r>
+              <a:rPr lang="da-DK" dirty="0"/>
+              <a:t>original </a:t>
+            </a:r>
+            <a:r>
+              <a:rPr lang="da-DK" dirty="0" smtClean="0"/>
+              <a:t>shell ‘sh’ </a:t>
+            </a:r>
+            <a:r>
+              <a:rPr lang="da-DK" dirty="0"/>
+              <a:t>was </a:t>
             </a:r>
             <a:r>
               <a:rPr lang="da-DK" dirty="0" smtClean="0"/>
@@ -8635,8 +8806,13 @@
             </a:r>
             <a:r>
               <a:rPr lang="da-DK" dirty="0"/>
-              <a:t>Stephen Bourne)</a:t>
-            </a:r>
+              <a:t>Stephen </a:t>
+            </a:r>
+            <a:r>
+              <a:rPr lang="da-DK" dirty="0" smtClean="0"/>
+              <a:t>Bourne</a:t>
+            </a:r>
+            <a:endParaRPr lang="da-DK" dirty="0"/>
           </a:p>
           <a:p>
             <a:r>
@@ -8755,7 +8931,7 @@
         </p:blipFill>
         <p:spPr bwMode="auto">
           <a:xfrm>
-            <a:off x="2590800" y="4657725"/>
+            <a:off x="2590800" y="4886325"/>
             <a:ext cx="3581400" cy="1514475"/>
           </a:xfrm>
           <a:prstGeom prst="rect">
@@ -8870,7 +9046,15 @@
           <a:p>
             <a:r>
               <a:rPr lang="da-DK" dirty="0" smtClean="0"/>
-              <a:t>Bash is well maintained and is still under development</a:t>
+              <a:t>Bash is well maintained and </a:t>
+            </a:r>
+            <a:r>
+              <a:rPr lang="da-DK" dirty="0" smtClean="0"/>
+              <a:t>is under regular </a:t>
+            </a:r>
+            <a:r>
+              <a:rPr lang="da-DK" dirty="0" smtClean="0"/>
+              <a:t>development</a:t>
             </a:r>
           </a:p>
           <a:p>
@@ -8928,17 +9112,12 @@
               <a:rPr lang="en-GB" dirty="0" smtClean="0"/>
               <a:t>2020)</a:t>
             </a:r>
-            <a:endParaRPr lang="en-GB" dirty="0" smtClean="0"/>
           </a:p>
           <a:p>
             <a:pPr lvl="1"/>
             <a:r>
               <a:rPr lang="en-GB" dirty="0" smtClean="0"/>
-              <a:t>The current </a:t>
-            </a:r>
-            <a:r>
-              <a:rPr lang="en-GB" dirty="0" smtClean="0"/>
-              <a:t>maintainer</a:t>
+              <a:t>The current maintainer</a:t>
             </a:r>
             <a:r>
               <a:rPr lang="en-GB" dirty="0"/>
@@ -9165,7 +9344,15 @@
             </a:r>
             <a:r>
               <a:rPr lang="da-DK" dirty="0" smtClean="0"/>
-              <a:t>the machine running Linux, you can test your Bash code online</a:t>
+              <a:t>the </a:t>
+            </a:r>
+            <a:r>
+              <a:rPr lang="da-DK" dirty="0" smtClean="0"/>
+              <a:t>computer </a:t>
+            </a:r>
+            <a:r>
+              <a:rPr lang="da-DK" dirty="0" smtClean="0"/>
+              <a:t>running Linux, you can test your Bash code online</a:t>
             </a:r>
           </a:p>
           <a:p>
@@ -9639,8 +9826,16 @@
           <a:p>
             <a:pPr lvl="1"/>
             <a:r>
+              <a:rPr lang="da-DK" dirty="0"/>
+              <a:t>e</a:t>
+            </a:r>
+            <a:r>
               <a:rPr lang="da-DK" dirty="0" smtClean="0"/>
-              <a:t>Examples: Bash, Python, Mathematica</a:t>
+              <a:t>xamples</a:t>
+            </a:r>
+            <a:r>
+              <a:rPr lang="da-DK" dirty="0" smtClean="0"/>
+              <a:t>: Bash, Python, Mathematica</a:t>
             </a:r>
           </a:p>
           <a:p>
@@ -9670,8 +9865,16 @@
           <a:p>
             <a:pPr lvl="1"/>
             <a:r>
+              <a:rPr lang="da-DK" dirty="0"/>
+              <a:t>e</a:t>
+            </a:r>
+            <a:r>
               <a:rPr lang="da-DK" dirty="0" smtClean="0"/>
-              <a:t>Examples: C, C++, Java</a:t>
+              <a:t>xamples</a:t>
+            </a:r>
+            <a:r>
+              <a:rPr lang="da-DK" dirty="0" smtClean="0"/>
+              <a:t>: C, C++, Java</a:t>
             </a:r>
           </a:p>
         </p:txBody>
@@ -10826,11 +11029,7 @@
           <a:p>
             <a:r>
               <a:rPr lang="en-GB" dirty="0" smtClean="0"/>
-              <a:t>Object-oriented framework, written </a:t>
-            </a:r>
-            <a:r>
-              <a:rPr lang="en-GB" dirty="0" smtClean="0"/>
-              <a:t>in </a:t>
+              <a:t>Object-oriented framework, written in </a:t>
             </a:r>
             <a:r>
               <a:rPr lang="en-GB" dirty="0"/>
@@ -10901,7 +11100,6 @@
               <a:rPr lang="en-GB" dirty="0" smtClean="0"/>
               <a:t>6.22.02 (August 17, 2020)</a:t>
             </a:r>
-            <a:endParaRPr lang="en-GB" dirty="0" smtClean="0"/>
           </a:p>
           <a:p>
             <a:r>
@@ -10920,12 +11118,19 @@
               </a:rPr>
               <a:t>/</a:t>
             </a:r>
-            <a:endParaRPr lang="en-US" dirty="0" smtClean="0"/>
+            <a:r>
+              <a:rPr lang="en-US" dirty="0" smtClean="0"/>
+              <a:t> </a:t>
+            </a:r>
           </a:p>
           <a:p>
             <a:r>
               <a:rPr lang="en-GB" dirty="0" smtClean="0"/>
-              <a:t>Root forum: </a:t>
+              <a:t>Root </a:t>
+            </a:r>
+            <a:r>
+              <a:rPr lang="en-GB" dirty="0" smtClean="0"/>
+              <a:t>forum: </a:t>
             </a:r>
             <a:r>
               <a:rPr lang="en-US" dirty="0">
@@ -11411,13 +11616,7 @@
               <a:rPr lang="da-DK" dirty="0" smtClean="0">
                 <a:effectLst/>
               </a:rPr>
-              <a:t>When &amp; where</a:t>
-            </a:r>
-            <a:r>
-              <a:rPr lang="da-DK" dirty="0" smtClean="0">
-                <a:effectLst/>
-              </a:rPr>
-              <a:t>:</a:t>
+              <a:t>When &amp; where:</a:t>
             </a:r>
             <a:endParaRPr lang="en-US" dirty="0" smtClean="0">
               <a:effectLst/>
@@ -11446,13 +11645,25 @@
               <a:rPr lang="en-US" dirty="0" smtClean="0">
                 <a:effectLst/>
               </a:rPr>
-              <a:t>Physics Department, E12 seminar room </a:t>
+              <a:t>Physics Department, </a:t>
             </a:r>
             <a:r>
               <a:rPr lang="en-US" dirty="0" smtClean="0">
                 <a:effectLst/>
               </a:rPr>
-              <a:t>2024</a:t>
+              <a:t>E6</a:t>
+            </a:r>
+            <a:r>
+              <a:rPr lang="en-US" dirty="0" smtClean="0">
+                <a:effectLst/>
+              </a:rPr>
+              <a:t>2 </a:t>
+            </a:r>
+            <a:r>
+              <a:rPr lang="en-US" dirty="0" smtClean="0">
+                <a:effectLst/>
+              </a:rPr>
+              <a:t>seminar room 2024</a:t>
             </a:r>
           </a:p>
           <a:p>
@@ -11508,17 +11719,8 @@
               <a:rPr lang="en-US" dirty="0" smtClean="0">
                 <a:effectLst/>
               </a:rPr>
-              <a:t>12 contact days (last lecture is on July </a:t>
-            </a:r>
-            <a:r>
-              <a:rPr lang="en-US" dirty="0" smtClean="0">
-                <a:effectLst/>
-              </a:rPr>
-              <a:t>15th) </a:t>
-            </a:r>
-            <a:endParaRPr lang="en-US" dirty="0" smtClean="0">
-              <a:effectLst/>
-            </a:endParaRPr>
+              <a:t>12 contact days (last lecture is on July 15th) </a:t>
+            </a:r>
           </a:p>
           <a:p>
             <a:pPr marL="109728" indent="0" fontAlgn="auto">
@@ -11786,13 +11988,7 @@
               <a:rPr lang="en-US" dirty="0" smtClean="0">
                 <a:effectLst/>
               </a:rPr>
-              <a:t>ral </a:t>
-            </a:r>
-            <a:r>
-              <a:rPr lang="en-US" dirty="0" smtClean="0">
-                <a:effectLst/>
-              </a:rPr>
-              <a:t>examination </a:t>
+              <a:t>ral examination </a:t>
             </a:r>
             <a:r>
               <a:rPr lang="en-US" dirty="0">
@@ -12219,11 +12415,7 @@
           <a:p>
             <a:r>
               <a:rPr lang="da-DK" sz="3200" b="1" dirty="0" smtClean="0"/>
-              <a:t>Course t</a:t>
-            </a:r>
-            <a:r>
-              <a:rPr lang="da-DK" sz="3200" b="1" dirty="0" smtClean="0"/>
-              <a:t>rivia</a:t>
+              <a:t>Course trivia</a:t>
             </a:r>
             <a:endParaRPr lang="en-US" sz="3200" dirty="0"/>
           </a:p>
@@ -12247,13 +12439,21 @@
         </p:spPr>
         <p:txBody>
           <a:bodyPr>
-            <a:normAutofit fontScale="92500" lnSpcReduction="10000"/>
+            <a:normAutofit/>
           </a:bodyPr>
           <a:lstStyle/>
           <a:p>
             <a:r>
               <a:rPr lang="en-US" dirty="0" smtClean="0"/>
-              <a:t>Given the current situation, the presence in person during the lecture is not mandatory, but it’s possible</a:t>
+              <a:t>Given the current </a:t>
+            </a:r>
+            <a:r>
+              <a:rPr lang="en-US" dirty="0" smtClean="0"/>
+              <a:t>situation with pandemic, </a:t>
+            </a:r>
+            <a:r>
+              <a:rPr lang="en-US" dirty="0" smtClean="0"/>
+              <a:t>the presence in person during the lecture is not mandatory, but it’s possible</a:t>
             </a:r>
           </a:p>
           <a:p>
@@ -12264,7 +12464,7 @@
             <a:r>
               <a:rPr lang="en-US" b="1" dirty="0" smtClean="0">
                 <a:solidFill>
-                  <a:srgbClr val="00B050"/>
+                  <a:srgbClr val="C00000"/>
                 </a:solidFill>
               </a:rPr>
               <a:t>Zoom</a:t>
@@ -12316,222 +12516,53 @@
             </a:r>
           </a:p>
           <a:p>
-            <a:r>
-              <a:rPr lang="en-GB" dirty="0" smtClean="0"/>
-              <a:t>You </a:t>
-            </a:r>
-            <a:r>
-              <a:rPr lang="en-GB" dirty="0"/>
-              <a:t>connect either</a:t>
-            </a:r>
-            <a:r>
-              <a:rPr lang="en-GB" dirty="0" smtClean="0"/>
-              <a:t>:</a:t>
-            </a:r>
-          </a:p>
-          <a:p>
             <a:pPr lvl="1"/>
             <a:r>
-              <a:rPr lang="en-GB" sz="1900" dirty="0"/>
-              <a:t>By using the direct link</a:t>
-            </a:r>
-            <a:r>
-              <a:rPr lang="en-GB" sz="1900" dirty="0" smtClean="0"/>
-              <a:t>:</a:t>
-            </a:r>
-          </a:p>
-          <a:p>
-            <a:pPr marL="411480" lvl="1" indent="0">
-              <a:buNone/>
-            </a:pPr>
-            <a:r>
-              <a:rPr lang="en-GB" sz="2000" dirty="0" smtClean="0"/>
-              <a:t>   </a:t>
-            </a:r>
-            <a:r>
-              <a:rPr lang="en-GB" sz="1900" dirty="0"/>
-              <a:t> </a:t>
-            </a:r>
-            <a:r>
-              <a:rPr lang="en-GB" sz="1900" dirty="0">
-                <a:hlinkClick r:id="rId3"/>
-              </a:rPr>
-              <a:t>https://</a:t>
-            </a:r>
-            <a:r>
-              <a:rPr lang="en-GB" sz="1900" dirty="0" smtClean="0">
-                <a:hlinkClick r:id="rId3"/>
-              </a:rPr>
-              <a:t>tum-conf.zoom.us/j/62805615622</a:t>
-            </a:r>
-            <a:r>
-              <a:rPr lang="en-GB" sz="1900" dirty="0">
+              <a:rPr lang="en-GB" b="1" dirty="0" smtClean="0">
                 <a:solidFill>
-                  <a:srgbClr val="00B050"/>
-                </a:solidFill>
-              </a:rPr>
-              <a:t> </a:t>
-            </a:r>
-            <a:r>
-              <a:rPr lang="en-GB" sz="1900" b="1" dirty="0">
-                <a:solidFill>
-                  <a:srgbClr val="00B050"/>
-                </a:solidFill>
-              </a:rPr>
-              <a:t>(Password: PH8124)</a:t>
-            </a:r>
-            <a:endParaRPr lang="en-GB" sz="1900" dirty="0" smtClean="0"/>
-          </a:p>
-          <a:p>
-            <a:pPr marL="411480" lvl="1" indent="0">
-              <a:buNone/>
-            </a:pPr>
-            <a:r>
-              <a:rPr lang="en-GB" sz="1900" dirty="0" smtClean="0"/>
-              <a:t>  </a:t>
-            </a:r>
-            <a:r>
-              <a:rPr lang="en-GB" sz="900" dirty="0" smtClean="0">
-                <a:effectLst>
-                  <a:outerShdw blurRad="38100" dist="38100" dir="2700000" algn="tl">
-                    <a:srgbClr val="000000">
-                      <a:alpha val="43137"/>
-                    </a:srgbClr>
-                  </a:outerShdw>
-                </a:effectLst>
-              </a:rPr>
-              <a:t> </a:t>
-            </a:r>
-            <a:endParaRPr lang="en-GB" sz="900" dirty="0" smtClean="0">
-              <a:effectLst>
-                <a:outerShdw blurRad="38100" dist="38100" dir="2700000" algn="tl">
-                  <a:srgbClr val="000000">
-                    <a:alpha val="43137"/>
-                  </a:srgbClr>
-                </a:outerShdw>
-              </a:effectLst>
-            </a:endParaRPr>
-          </a:p>
-          <a:p>
-            <a:pPr lvl="1"/>
-            <a:r>
-              <a:rPr lang="en-DE" sz="1900" dirty="0" smtClean="0"/>
-              <a:t>…</a:t>
-            </a:r>
-            <a:r>
-              <a:rPr lang="en-GB" sz="1900" dirty="0" smtClean="0"/>
-              <a:t> or d</a:t>
-            </a:r>
-            <a:r>
-              <a:rPr lang="en-GB" sz="1900" dirty="0" smtClean="0"/>
-              <a:t>ownload </a:t>
-            </a:r>
-            <a:r>
-              <a:rPr lang="en-GB" sz="1900" dirty="0"/>
-              <a:t>and start </a:t>
-            </a:r>
-            <a:r>
-              <a:rPr lang="en-GB" sz="1900" b="1" dirty="0">
-                <a:solidFill>
-                  <a:srgbClr val="00B050"/>
+                  <a:srgbClr val="C00000"/>
                 </a:solidFill>
               </a:rPr>
               <a:t>Zoom</a:t>
             </a:r>
             <a:r>
-              <a:rPr lang="en-GB" sz="1900" dirty="0"/>
-              <a:t>, and then use:</a:t>
-            </a:r>
-            <a:br>
-              <a:rPr lang="en-GB" sz="1900" dirty="0"/>
-            </a:br>
-            <a:r>
-              <a:rPr lang="en-GB" sz="1900" b="1" dirty="0">
-                <a:solidFill>
-                  <a:srgbClr val="00B050"/>
-                </a:solidFill>
-              </a:rPr>
-              <a:t>Meeting ID: </a:t>
-            </a:r>
-            <a:r>
-              <a:rPr lang="en-DE" sz="1900" b="1" dirty="0" smtClean="0">
-                <a:solidFill>
-                  <a:srgbClr val="00B050"/>
-                </a:solidFill>
-              </a:rPr>
-              <a:t>628 </a:t>
-            </a:r>
-            <a:r>
-              <a:rPr lang="en-DE" sz="1900" b="1" dirty="0">
-                <a:solidFill>
-                  <a:srgbClr val="00B050"/>
-                </a:solidFill>
-              </a:rPr>
-              <a:t>0561 5622</a:t>
-            </a:r>
-            <a:r>
-              <a:rPr lang="en-GB" sz="1900" b="1" dirty="0" smtClean="0">
-                <a:solidFill>
-                  <a:srgbClr val="00B050"/>
-                </a:solidFill>
-              </a:rPr>
-              <a:t> </a:t>
-            </a:r>
-            <a:r>
-              <a:rPr lang="en-GB" sz="1900" b="1" dirty="0">
-                <a:solidFill>
-                  <a:srgbClr val="00B050"/>
-                </a:solidFill>
-              </a:rPr>
-              <a:t/>
-            </a:r>
-            <a:br>
-              <a:rPr lang="en-GB" sz="1900" b="1" dirty="0">
-                <a:solidFill>
-                  <a:srgbClr val="00B050"/>
-                </a:solidFill>
-              </a:rPr>
-            </a:br>
-            <a:r>
-              <a:rPr lang="en-GB" sz="1900" b="1" dirty="0">
-                <a:solidFill>
-                  <a:srgbClr val="00B050"/>
-                </a:solidFill>
-              </a:rPr>
-              <a:t>Password: </a:t>
-            </a:r>
-            <a:r>
-              <a:rPr lang="en-GB" sz="1900" b="1" dirty="0" smtClean="0">
-                <a:solidFill>
-                  <a:srgbClr val="00B050"/>
-                </a:solidFill>
-              </a:rPr>
-              <a:t>PH8124</a:t>
-            </a:r>
-            <a:endParaRPr lang="en-GB" sz="1900" b="1" dirty="0" smtClean="0">
-              <a:solidFill>
-                <a:srgbClr val="00B050"/>
-              </a:solidFill>
-            </a:endParaRPr>
+              <a:rPr lang="en-GB" dirty="0" smtClean="0"/>
+              <a:t> coordinates will be distributed via the official mailing list </a:t>
+            </a:r>
+            <a:r>
+              <a:rPr lang="en-GB" dirty="0"/>
+              <a:t>in </a:t>
+            </a:r>
+            <a:r>
+              <a:rPr lang="en-GB" dirty="0" err="1"/>
+              <a:t>TUMonline</a:t>
+            </a:r>
+            <a:r>
+              <a:rPr lang="en-GB" dirty="0" smtClean="0"/>
+              <a:t> to all registered students for this course</a:t>
+            </a:r>
+            <a:endParaRPr lang="en-GB" dirty="0" smtClean="0"/>
           </a:p>
           <a:p>
             <a:r>
               <a:rPr lang="en-US" dirty="0" smtClean="0"/>
-              <a:t>The lectures will be recorded, and recordings shared</a:t>
-            </a:r>
-          </a:p>
-          <a:p>
+              <a:t>The </a:t>
+            </a:r>
+            <a:r>
+              <a:rPr lang="en-US" dirty="0" smtClean="0"/>
+              <a:t>lectures will be recorded, and recordings </a:t>
+            </a:r>
+            <a:r>
+              <a:rPr lang="en-US" dirty="0" smtClean="0"/>
+              <a:t>shared immediately afterward</a:t>
+            </a:r>
             <a:endParaRPr lang="en-US" dirty="0" smtClean="0"/>
           </a:p>
           <a:p>
-            <a:pPr marL="109728" lvl="1" indent="0">
-              <a:buClr>
-                <a:schemeClr val="tx1"/>
-              </a:buClr>
-              <a:buSzPct val="125000"/>
+            <a:pPr marL="109728" indent="0">
               <a:buNone/>
             </a:pPr>
-            <a:endParaRPr lang="en-US" sz="1900" dirty="0"/>
+            <a:endParaRPr lang="en-US" dirty="0" smtClean="0"/>
           </a:p>
         </p:txBody>
       </p:sp>
@@ -12655,7 +12686,15 @@
           <a:p>
             <a:r>
               <a:rPr lang="en-US" dirty="0" smtClean="0"/>
-              <a:t>The lecture has a dedicated webpage:</a:t>
+              <a:t>The </a:t>
+            </a:r>
+            <a:r>
+              <a:rPr lang="en-US" dirty="0" smtClean="0"/>
+              <a:t>course </a:t>
+            </a:r>
+            <a:r>
+              <a:rPr lang="en-US" dirty="0" smtClean="0"/>
+              <a:t>has a dedicated webpage:</a:t>
             </a:r>
           </a:p>
           <a:p>
@@ -12832,7 +12871,7 @@
         <p:spPr>
           <a:xfrm>
             <a:off x="304800" y="1371600"/>
-            <a:ext cx="8686800" cy="4724400"/>
+            <a:ext cx="8686800" cy="4800600"/>
           </a:xfrm>
         </p:spPr>
         <p:txBody>
@@ -12843,27 +12882,11 @@
           <a:p>
             <a:r>
               <a:rPr lang="en-US" dirty="0" smtClean="0"/>
-              <a:t>After each lecture, executive summary of the covered material will be shared via email </a:t>
+              <a:t>After each lecture, executive summary of the covered material will be shared via </a:t>
             </a:r>
             <a:r>
               <a:rPr lang="en-US" dirty="0" smtClean="0"/>
-              <a:t>through the </a:t>
-            </a:r>
-            <a:r>
-              <a:rPr lang="en-US" dirty="0" smtClean="0"/>
-              <a:t>official </a:t>
-            </a:r>
-            <a:r>
-              <a:rPr lang="en-US" dirty="0" err="1" smtClean="0"/>
-              <a:t>TUMonline</a:t>
-            </a:r>
-            <a:r>
-              <a:rPr lang="en-US" dirty="0" smtClean="0"/>
-              <a:t> </a:t>
-            </a:r>
-            <a:r>
-              <a:rPr lang="en-US" dirty="0" smtClean="0"/>
-              <a:t>interface for this course</a:t>
+              <a:t>email </a:t>
             </a:r>
           </a:p>
           <a:p>
@@ -12875,7 +12898,11 @@
           <a:p>
             <a:r>
               <a:rPr lang="en-GB" dirty="0" smtClean="0"/>
-              <a:t>In the same way, I will also share the homework exercises</a:t>
+              <a:t>In </a:t>
+            </a:r>
+            <a:r>
+              <a:rPr lang="en-GB" dirty="0" smtClean="0"/>
+              <a:t>the same way, I will also share the homework exercises</a:t>
             </a:r>
             <a:endParaRPr lang="en-US" dirty="0" smtClean="0"/>
           </a:p>
@@ -12891,21 +12918,8 @@
             </a:r>
             <a:r>
               <a:rPr lang="da-DK" dirty="0" smtClean="0"/>
-              <a:t>: </a:t>
-            </a:r>
-            <a:r>
-              <a:rPr lang="da-DK" b="1" dirty="0" smtClean="0">
-                <a:solidFill>
-                  <a:srgbClr val="FF0000"/>
-                </a:solidFill>
-              </a:rPr>
-              <a:t>TBI</a:t>
-            </a:r>
-            <a:endParaRPr lang="da-DK" b="1" dirty="0" smtClean="0">
-              <a:solidFill>
-                <a:srgbClr val="FF0000"/>
-              </a:solidFill>
-            </a:endParaRPr>
+              <a:t>:</a:t>
+            </a:r>
           </a:p>
           <a:p>
             <a:pPr lvl="1"/>
@@ -13001,7 +13015,26 @@
               <a:rPr lang="en-GB" sz="1600" dirty="0" smtClean="0"/>
               <a:t>)</a:t>
             </a:r>
-            <a:endParaRPr lang="en-GB" sz="1600" dirty="0"/>
+          </a:p>
+          <a:p>
+            <a:pPr lvl="1"/>
+            <a:r>
+              <a:rPr lang="en-GB" dirty="0"/>
+              <a:t>Richard Blum and Christine </a:t>
+            </a:r>
+            <a:r>
+              <a:rPr lang="en-GB" dirty="0" err="1"/>
+              <a:t>Bresnahan</a:t>
+            </a:r>
+            <a:r>
+              <a:rPr lang="en-GB" dirty="0"/>
+              <a:t>, ‘Linux Command Line and Shell Scripting Bible</a:t>
+            </a:r>
+            <a:r>
+              <a:rPr lang="en-GB" dirty="0" smtClean="0"/>
+              <a:t>’</a:t>
+            </a:r>
+            <a:endParaRPr lang="en-GB" dirty="0"/>
           </a:p>
         </p:txBody>
       </p:sp>
@@ -13808,7 +13841,6 @@
               <a:rPr lang="da-DK" dirty="0" smtClean="0"/>
               <a:t>classification:</a:t>
             </a:r>
-            <a:endParaRPr lang="da-DK" dirty="0" smtClean="0"/>
           </a:p>
           <a:p>
             <a:pPr lvl="1"/>
@@ -13818,11 +13850,7 @@
             </a:r>
             <a:r>
               <a:rPr lang="en-GB" dirty="0" smtClean="0"/>
-              <a:t>Non-physics elective course</a:t>
-            </a:r>
-            <a:r>
-              <a:rPr lang="en-GB" dirty="0" smtClean="0"/>
-              <a:t>’</a:t>
+              <a:t>Non-physics elective course’</a:t>
             </a:r>
           </a:p>
           <a:p>
@@ -13841,7 +13869,11 @@
             </a:r>
             <a:r>
               <a:rPr lang="en-GB" dirty="0" smtClean="0"/>
-              <a:t>Master students</a:t>
+              <a:t>Masters </a:t>
+            </a:r>
+            <a:r>
+              <a:rPr lang="en-GB" dirty="0" smtClean="0"/>
+              <a:t>students</a:t>
             </a:r>
           </a:p>
           <a:p>
@@ -13861,11 +13893,7 @@
           <a:p>
             <a:r>
               <a:rPr lang="da-DK" dirty="0" smtClean="0"/>
-              <a:t>Course </a:t>
-            </a:r>
-            <a:r>
-              <a:rPr lang="da-DK" dirty="0" smtClean="0"/>
-              <a:t>evaluation:</a:t>
+              <a:t>Course evaluation:</a:t>
             </a:r>
             <a:endParaRPr lang="en-US" dirty="0" smtClean="0"/>
           </a:p>
@@ -13873,15 +13901,7 @@
             <a:pPr lvl="1"/>
             <a:r>
               <a:rPr lang="en-GB" dirty="0" smtClean="0"/>
-              <a:t>At some point during the lecture, you will be asked to </a:t>
-            </a:r>
-            <a:r>
-              <a:rPr lang="en-GB" dirty="0" smtClean="0"/>
-              <a:t>evaluate this </a:t>
-            </a:r>
-            <a:r>
-              <a:rPr lang="en-GB" dirty="0" smtClean="0"/>
-              <a:t>course: Please, do it! (</a:t>
+              <a:t>At some point during the lecture, you will be asked to evaluate this course: Please, do it! (</a:t>
             </a:r>
             <a:r>
               <a:rPr lang="en-GB" dirty="0"/>

</xml_diff>